<commit_message>
update lecture 6 & 7
</commit_message>
<xml_diff>
--- a/lectures/lec6/Lec6-Modulation.pptx
+++ b/lectures/lec6/Lec6-Modulation.pptx
@@ -324,7 +324,7 @@
             <a:fld id="{F33530C9-BF13-40EE-A1EC-EBBB0134EBBA}" type="datetime1">
               <a:rPr lang="en-US"/>
               <a:pPr/>
-              <a:t>11/6/2015</a:t>
+              <a:t>11/13/2015</a:t>
             </a:fld>
             <a:endParaRPr lang="en-US"/>
           </a:p>
@@ -542,7 +542,7 @@
             <a:fld id="{7DD20F8F-B3A0-465C-A2C5-4272F8BE0711}" type="datetime1">
               <a:rPr lang="en-US"/>
               <a:pPr/>
-              <a:t>11/6/2015</a:t>
+              <a:t>11/13/2015</a:t>
             </a:fld>
             <a:endParaRPr lang="en-US"/>
           </a:p>
@@ -941,7 +941,7 @@
             <a:fld id="{7DD20F8F-B3A0-465C-A2C5-4272F8BE0711}" type="datetime1">
               <a:rPr lang="en-US" smtClean="0"/>
               <a:pPr/>
-              <a:t>11/6/2015</a:t>
+              <a:t>11/13/2015</a:t>
             </a:fld>
             <a:endParaRPr lang="en-US"/>
           </a:p>
@@ -1054,7 +1054,7 @@
             <a:fld id="{7DD20F8F-B3A0-465C-A2C5-4272F8BE0711}" type="datetime1">
               <a:rPr lang="en-US" smtClean="0"/>
               <a:pPr/>
-              <a:t>11/6/2015</a:t>
+              <a:t>11/13/2015</a:t>
             </a:fld>
             <a:endParaRPr lang="en-US"/>
           </a:p>
@@ -1171,7 +1171,7 @@
             <a:fld id="{7DD20F8F-B3A0-465C-A2C5-4272F8BE0711}" type="datetime1">
               <a:rPr lang="en-US" smtClean="0"/>
               <a:pPr/>
-              <a:t>11/6/2015</a:t>
+              <a:t>11/13/2015</a:t>
             </a:fld>
             <a:endParaRPr lang="en-US"/>
           </a:p>
@@ -2898,16 +2898,7 @@
                 </a:solidFill>
                 <a:latin typeface="Myriad Pro" panose="020B0503030403020204" pitchFamily="34" charset="0"/>
               </a:rPr>
-              <a:t>Lecture </a:t>
-            </a:r>
-            <a:r>
-              <a:rPr lang="en-US" sz="3200" dirty="0">
-                <a:solidFill>
-                  <a:srgbClr val="091D58"/>
-                </a:solidFill>
-                <a:latin typeface="Myriad Pro" panose="020B0503030403020204" pitchFamily="34" charset="0"/>
-              </a:rPr>
-              <a:t>6</a:t>
+              <a:t>Lecture 6</a:t>
             </a:r>
             <a:r>
               <a:rPr lang="en-US" sz="3200" dirty="0" smtClean="0">
@@ -2916,16 +2907,7 @@
                 </a:solidFill>
                 <a:latin typeface="Myriad Pro" panose="020B0503030403020204" pitchFamily="34" charset="0"/>
               </a:rPr>
-              <a:t>: </a:t>
-            </a:r>
-            <a:r>
-              <a:rPr lang="en-US" sz="3200" dirty="0" smtClean="0">
-                <a:solidFill>
-                  <a:srgbClr val="091D58"/>
-                </a:solidFill>
-                <a:latin typeface="Myriad Pro" panose="020B0503030403020204" pitchFamily="34" charset="0"/>
-              </a:rPr>
-              <a:t>	Building </a:t>
+              <a:t>: 	Building </a:t>
             </a:r>
             <a:r>
               <a:rPr lang="en-US" sz="3200" dirty="0">
@@ -3974,7 +3956,7 @@
           <a:graphicData uri="http://schemas.openxmlformats.org/presentationml/2006/ole">
             <mc:AlternateContent xmlns:mc="http://schemas.openxmlformats.org/markup-compatibility/2006">
               <mc:Choice xmlns:v="urn:schemas-microsoft-com:vml" Requires="v">
-                <p:oleObj spid="_x0000_s15378" name="Equation" r:id="rId3" imgW="457200" imgH="228600" progId="">
+                <p:oleObj spid="_x0000_s15380" name="Equation" r:id="rId3" imgW="457200" imgH="228600" progId="">
                   <p:embed/>
                 </p:oleObj>
               </mc:Choice>
@@ -4707,7 +4689,7 @@
           <a:graphicData uri="http://schemas.openxmlformats.org/presentationml/2006/ole">
             <mc:AlternateContent xmlns:mc="http://schemas.openxmlformats.org/markup-compatibility/2006">
               <mc:Choice xmlns:v="urn:schemas-microsoft-com:vml" Requires="v">
-                <p:oleObj spid="_x0000_s15379" name="Equation" r:id="rId5" imgW="545760" imgH="228600" progId="">
+                <p:oleObj spid="_x0000_s15381" name="Equation" r:id="rId5" imgW="545760" imgH="228600" progId="">
                   <p:embed/>
                 </p:oleObj>
               </mc:Choice>
@@ -4919,7 +4901,7 @@
           <a:graphicData uri="http://schemas.openxmlformats.org/presentationml/2006/ole">
             <mc:AlternateContent xmlns:mc="http://schemas.openxmlformats.org/markup-compatibility/2006">
               <mc:Choice xmlns:v="urn:schemas-microsoft-com:vml" Requires="v">
-                <p:oleObj spid="_x0000_s6194" name="Equation" r:id="rId4" imgW="3377880" imgH="939600" progId="">
+                <p:oleObj spid="_x0000_s6196" name="Equation" r:id="rId4" imgW="3377880" imgH="939600" progId="">
                   <p:embed/>
                 </p:oleObj>
               </mc:Choice>
@@ -4995,7 +4977,7 @@
           <a:graphicData uri="http://schemas.openxmlformats.org/presentationml/2006/ole">
             <mc:AlternateContent xmlns:mc="http://schemas.openxmlformats.org/markup-compatibility/2006">
               <mc:Choice xmlns:v="urn:schemas-microsoft-com:vml" Requires="v">
-                <p:oleObj spid="_x0000_s6195" name="Equation" r:id="rId6" imgW="3390840" imgH="939600" progId="">
+                <p:oleObj spid="_x0000_s6197" name="Equation" r:id="rId6" imgW="3390840" imgH="939600" progId="">
                   <p:embed/>
                 </p:oleObj>
               </mc:Choice>
@@ -6989,7 +6971,7 @@
           <a:graphicData uri="http://schemas.openxmlformats.org/presentationml/2006/ole">
             <mc:AlternateContent xmlns:mc="http://schemas.openxmlformats.org/markup-compatibility/2006">
               <mc:Choice xmlns:v="urn:schemas-microsoft-com:vml" Requires="v">
-                <p:oleObj spid="_x0000_s7200" name="Equation" r:id="rId3" imgW="457200" imgH="228600" progId="">
+                <p:oleObj spid="_x0000_s7202" name="Equation" r:id="rId3" imgW="457200" imgH="228600" progId="">
                   <p:embed/>
                 </p:oleObj>
               </mc:Choice>
@@ -7508,7 +7490,7 @@
           <a:graphicData uri="http://schemas.openxmlformats.org/presentationml/2006/ole">
             <mc:AlternateContent xmlns:mc="http://schemas.openxmlformats.org/markup-compatibility/2006">
               <mc:Choice xmlns:v="urn:schemas-microsoft-com:vml" Requires="v">
-                <p:oleObj spid="_x0000_s7201" name="Equation" r:id="rId5" imgW="545760" imgH="228600" progId="">
+                <p:oleObj spid="_x0000_s7203" name="Equation" r:id="rId5" imgW="545760" imgH="228600" progId="">
                   <p:embed/>
                 </p:oleObj>
               </mc:Choice>
@@ -8884,7 +8866,7 @@
           <a:graphicData uri="http://schemas.openxmlformats.org/presentationml/2006/ole">
             <mc:AlternateContent xmlns:mc="http://schemas.openxmlformats.org/markup-compatibility/2006">
               <mc:Choice xmlns:v="urn:schemas-microsoft-com:vml" Requires="v">
-                <p:oleObj spid="_x0000_s23564" name="Equation" r:id="rId4" imgW="457200" imgH="228600" progId="">
+                <p:oleObj spid="_x0000_s23565" name="Equation" r:id="rId4" imgW="457200" imgH="228600" progId="">
                   <p:embed/>
                 </p:oleObj>
               </mc:Choice>
@@ -10540,7 +10522,7 @@
           <a:graphicData uri="http://schemas.openxmlformats.org/presentationml/2006/ole">
             <mc:AlternateContent xmlns:mc="http://schemas.openxmlformats.org/markup-compatibility/2006">
               <mc:Choice xmlns:v="urn:schemas-microsoft-com:vml" Requires="v">
-                <p:oleObj spid="_x0000_s24616" name="Equation" r:id="rId3" imgW="457200" imgH="228600" progId="">
+                <p:oleObj spid="_x0000_s24620" name="Equation" r:id="rId3" imgW="457200" imgH="228600" progId="">
                   <p:embed/>
                 </p:oleObj>
               </mc:Choice>
@@ -11059,7 +11041,7 @@
           <a:graphicData uri="http://schemas.openxmlformats.org/presentationml/2006/ole">
             <mc:AlternateContent xmlns:mc="http://schemas.openxmlformats.org/markup-compatibility/2006">
               <mc:Choice xmlns:v="urn:schemas-microsoft-com:vml" Requires="v">
-                <p:oleObj spid="_x0000_s24617" name="Equation" r:id="rId5" imgW="545760" imgH="228600" progId="">
+                <p:oleObj spid="_x0000_s24621" name="Equation" r:id="rId5" imgW="545760" imgH="228600" progId="">
                   <p:embed/>
                 </p:oleObj>
               </mc:Choice>
@@ -13077,7 +13059,7 @@
           <a:graphicData uri="http://schemas.openxmlformats.org/presentationml/2006/ole">
             <mc:AlternateContent xmlns:mc="http://schemas.openxmlformats.org/markup-compatibility/2006">
               <mc:Choice xmlns:v="urn:schemas-microsoft-com:vml" Requires="v">
-                <p:oleObj spid="_x0000_s24618" name="Equation" r:id="rId10" imgW="457200" imgH="228600" progId="">
+                <p:oleObj spid="_x0000_s24622" name="Equation" r:id="rId10" imgW="457200" imgH="228600" progId="">
                   <p:embed/>
                 </p:oleObj>
               </mc:Choice>
@@ -13596,7 +13578,7 @@
           <a:graphicData uri="http://schemas.openxmlformats.org/presentationml/2006/ole">
             <mc:AlternateContent xmlns:mc="http://schemas.openxmlformats.org/markup-compatibility/2006">
               <mc:Choice xmlns:v="urn:schemas-microsoft-com:vml" Requires="v">
-                <p:oleObj spid="_x0000_s24619" name="Equation" r:id="rId11" imgW="545760" imgH="228600" progId="">
+                <p:oleObj spid="_x0000_s24623" name="Equation" r:id="rId11" imgW="545760" imgH="228600" progId="">
                   <p:embed/>
                 </p:oleObj>
               </mc:Choice>
@@ -16201,7 +16183,11 @@
             <a:pPr lvl="1"/>
             <a:r>
               <a:rPr lang="en-US" dirty="0" smtClean="0"/>
-              <a:t>Lead to error in the demodulation if the frequency offset is large enough</a:t>
+              <a:t>Leads </a:t>
+            </a:r>
+            <a:r>
+              <a:rPr lang="en-US" dirty="0" smtClean="0"/>
+              <a:t>to error in the demodulation if the frequency offset is large enough</a:t>
             </a:r>
           </a:p>
           <a:p>
@@ -16234,7 +16220,7 @@
           <a:graphicData uri="http://schemas.openxmlformats.org/presentationml/2006/ole">
             <mc:AlternateContent xmlns:mc="http://schemas.openxmlformats.org/markup-compatibility/2006">
               <mc:Choice xmlns:v="urn:schemas-microsoft-com:vml" Requires="v">
-                <p:oleObj spid="_x0000_s9239" name="Equation" r:id="rId3" imgW="1968480" imgH="253800" progId="">
+                <p:oleObj spid="_x0000_s9241" name="Equation" r:id="rId3" imgW="1968480" imgH="253800" progId="">
                   <p:embed/>
                 </p:oleObj>
               </mc:Choice>
@@ -16302,7 +16288,7 @@
           <a:graphicData uri="http://schemas.openxmlformats.org/presentationml/2006/ole">
             <mc:AlternateContent xmlns:mc="http://schemas.openxmlformats.org/markup-compatibility/2006">
               <mc:Choice xmlns:v="urn:schemas-microsoft-com:vml" Requires="v">
-                <p:oleObj spid="_x0000_s9240" name="Equation" r:id="rId5" imgW="9270720" imgH="1930320" progId="Equation.DSMT4">
+                <p:oleObj spid="_x0000_s9242" name="Equation" r:id="rId5" imgW="9270720" imgH="1930320" progId="Equation.DSMT4">
                   <p:embed/>
                 </p:oleObj>
               </mc:Choice>
@@ -20802,7 +20788,7 @@
           <a:graphicData uri="http://schemas.openxmlformats.org/presentationml/2006/ole">
             <mc:AlternateContent xmlns:mc="http://schemas.openxmlformats.org/markup-compatibility/2006">
               <mc:Choice xmlns:v="urn:schemas-microsoft-com:vml" Requires="v">
-                <p:oleObj spid="_x0000_s12310" name="Equation" r:id="rId4" imgW="457200" imgH="228600" progId="">
+                <p:oleObj spid="_x0000_s12312" name="Equation" r:id="rId4" imgW="457200" imgH="228600" progId="">
                   <p:embed/>
                 </p:oleObj>
               </mc:Choice>
@@ -21609,7 +21595,7 @@
           <a:graphicData uri="http://schemas.openxmlformats.org/presentationml/2006/ole">
             <mc:AlternateContent xmlns:mc="http://schemas.openxmlformats.org/markup-compatibility/2006">
               <mc:Choice xmlns:v="urn:schemas-microsoft-com:vml" Requires="v">
-                <p:oleObj spid="_x0000_s12311" name="Equation" r:id="rId6" imgW="545760" imgH="228600" progId="">
+                <p:oleObj spid="_x0000_s12313" name="Equation" r:id="rId6" imgW="545760" imgH="228600" progId="">
                   <p:embed/>
                 </p:oleObj>
               </mc:Choice>
@@ -23351,7 +23337,7 @@
           <a:graphicData uri="http://schemas.openxmlformats.org/presentationml/2006/ole">
             <mc:AlternateContent xmlns:mc="http://schemas.openxmlformats.org/markup-compatibility/2006">
               <mc:Choice xmlns:v="urn:schemas-microsoft-com:vml" Requires="v">
-                <p:oleObj spid="_x0000_s14354" name="Equation" r:id="rId5" imgW="457200" imgH="228600" progId="">
+                <p:oleObj spid="_x0000_s14356" name="Equation" r:id="rId5" imgW="457200" imgH="228600" progId="">
                   <p:embed/>
                 </p:oleObj>
               </mc:Choice>
@@ -24158,7 +24144,7 @@
           <a:graphicData uri="http://schemas.openxmlformats.org/presentationml/2006/ole">
             <mc:AlternateContent xmlns:mc="http://schemas.openxmlformats.org/markup-compatibility/2006">
               <mc:Choice xmlns:v="urn:schemas-microsoft-com:vml" Requires="v">
-                <p:oleObj spid="_x0000_s14355" name="Equation" r:id="rId7" imgW="444240" imgH="228600" progId="Equation.DSMT4">
+                <p:oleObj spid="_x0000_s14357" name="Equation" r:id="rId7" imgW="444240" imgH="228600" progId="Equation.DSMT4">
                   <p:embed/>
                 </p:oleObj>
               </mc:Choice>
@@ -26136,7 +26122,7 @@
                 <a:graphicData uri="http://schemas.openxmlformats.org/presentationml/2006/ole">
                   <mc:AlternateContent>
                     <mc:Choice xmlns:v="urn:schemas-microsoft-com:vml" Requires="v">
-                      <p:oleObj spid="_x0000_s16408" name="Equation" r:id="rId5" imgW="457200" imgH="228600" progId="">
+                      <p:oleObj spid="_x0000_s16410" name="Equation" r:id="rId5" imgW="457200" imgH="228600" progId="">
                         <p:embed/>
                       </p:oleObj>
                     </mc:Choice>
@@ -26995,7 +26981,7 @@
                 <a:graphicData uri="http://schemas.openxmlformats.org/presentationml/2006/ole">
                   <mc:AlternateContent>
                     <mc:Choice xmlns:v="urn:schemas-microsoft-com:vml" Requires="v">
-                      <p:oleObj spid="_x0000_s16409" name="Equation" r:id="rId9" imgW="444240" imgH="228600" progId="Equation.DSMT4">
+                      <p:oleObj spid="_x0000_s16411" name="Equation" r:id="rId9" imgW="444240" imgH="228600" progId="Equation.DSMT4">
                         <p:embed/>
                       </p:oleObj>
                     </mc:Choice>
@@ -33497,7 +33483,19 @@
           <a:p>
             <a:r>
               <a:rPr lang="en-US" dirty="0"/>
-              <a:t>The performance of both the Hartley and the Weaver image reject mixers reply on the accuracy of the phase quadrature and amplitude </a:t>
+              <a:t>The performance of both the Hartley and the Weaver image reject </a:t>
+            </a:r>
+            <a:r>
+              <a:rPr lang="en-US"/>
+              <a:t>mixers </a:t>
+            </a:r>
+            <a:r>
+              <a:rPr lang="en-US" smtClean="0"/>
+              <a:t>rely </a:t>
+            </a:r>
+            <a:r>
+              <a:rPr lang="en-US" dirty="0"/>
+              <a:t>on the accuracy of the phase quadrature and amplitude </a:t>
             </a:r>
             <a:r>
               <a:rPr lang="en-US" dirty="0" smtClean="0"/>
@@ -33978,7 +33976,7 @@
           <a:graphicData uri="http://schemas.openxmlformats.org/presentationml/2006/ole">
             <mc:AlternateContent xmlns:mc="http://schemas.openxmlformats.org/markup-compatibility/2006">
               <mc:Choice xmlns:v="urn:schemas-microsoft-com:vml" Requires="v">
-                <p:oleObj spid="_x0000_s2086" name="Equation" r:id="rId4" imgW="4267080" imgH="939600" progId="Equation.DSMT4">
+                <p:oleObj spid="_x0000_s2088" name="Equation" r:id="rId4" imgW="4267080" imgH="939600" progId="Equation.DSMT4">
                   <p:embed/>
                 </p:oleObj>
               </mc:Choice>
@@ -34039,7 +34037,7 @@
           <a:graphicData uri="http://schemas.openxmlformats.org/presentationml/2006/ole">
             <mc:AlternateContent xmlns:mc="http://schemas.openxmlformats.org/markup-compatibility/2006">
               <mc:Choice xmlns:v="urn:schemas-microsoft-com:vml" Requires="v">
-                <p:oleObj spid="_x0000_s2087" name="Equation" r:id="rId6" imgW="1422360" imgH="253800" progId="Equation.DSMT4">
+                <p:oleObj spid="_x0000_s2089" name="Equation" r:id="rId6" imgW="1422360" imgH="253800" progId="Equation.DSMT4">
                   <p:embed/>
                 </p:oleObj>
               </mc:Choice>
@@ -36192,7 +36190,7 @@
           <a:graphicData uri="http://schemas.openxmlformats.org/presentationml/2006/ole">
             <mc:AlternateContent xmlns:mc="http://schemas.openxmlformats.org/markup-compatibility/2006">
               <mc:Choice xmlns:v="urn:schemas-microsoft-com:vml" Requires="v">
-                <p:oleObj spid="_x0000_s3089" name="Equation" r:id="rId3" imgW="3263760" imgH="787320" progId="">
+                <p:oleObj spid="_x0000_s3090" name="Equation" r:id="rId3" imgW="3263760" imgH="787320" progId="">
                   <p:embed/>
                 </p:oleObj>
               </mc:Choice>
@@ -38547,7 +38545,7 @@
           <a:graphicData uri="http://schemas.openxmlformats.org/presentationml/2006/ole">
             <mc:AlternateContent xmlns:mc="http://schemas.openxmlformats.org/markup-compatibility/2006">
               <mc:Choice xmlns:v="urn:schemas-microsoft-com:vml" Requires="v">
-                <p:oleObj spid="_x0000_s4140" name="Equation" r:id="rId4" imgW="457200" imgH="228600" progId="">
+                <p:oleObj spid="_x0000_s4142" name="Equation" r:id="rId4" imgW="457200" imgH="228600" progId="">
                   <p:embed/>
                 </p:oleObj>
               </mc:Choice>
@@ -38623,7 +38621,7 @@
           <a:graphicData uri="http://schemas.openxmlformats.org/presentationml/2006/ole">
             <mc:AlternateContent xmlns:mc="http://schemas.openxmlformats.org/markup-compatibility/2006">
               <mc:Choice xmlns:v="urn:schemas-microsoft-com:vml" Requires="v">
-                <p:oleObj spid="_x0000_s4141" name="Equation" r:id="rId6" imgW="545760" imgH="228600" progId="">
+                <p:oleObj spid="_x0000_s4143" name="Equation" r:id="rId6" imgW="545760" imgH="228600" progId="">
                   <p:embed/>
                 </p:oleObj>
               </mc:Choice>
@@ -39737,7 +39735,7 @@
           <a:graphicData uri="http://schemas.openxmlformats.org/presentationml/2006/ole">
             <mc:AlternateContent xmlns:mc="http://schemas.openxmlformats.org/markup-compatibility/2006">
               <mc:Choice xmlns:v="urn:schemas-microsoft-com:vml" Requires="v">
-                <p:oleObj spid="_x0000_s5170" name="Equation" r:id="rId4" imgW="457200" imgH="228600" progId="">
+                <p:oleObj spid="_x0000_s5172" name="Equation" r:id="rId4" imgW="457200" imgH="228600" progId="">
                   <p:embed/>
                 </p:oleObj>
               </mc:Choice>
@@ -40538,7 +40536,7 @@
           <a:graphicData uri="http://schemas.openxmlformats.org/presentationml/2006/ole">
             <mc:AlternateContent xmlns:mc="http://schemas.openxmlformats.org/markup-compatibility/2006">
               <mc:Choice xmlns:v="urn:schemas-microsoft-com:vml" Requires="v">
-                <p:oleObj spid="_x0000_s5171" name="Equation" r:id="rId6" imgW="545760" imgH="228600" progId="">
+                <p:oleObj spid="_x0000_s5173" name="Equation" r:id="rId6" imgW="545760" imgH="228600" progId="">
                   <p:embed/>
                 </p:oleObj>
               </mc:Choice>

</xml_diff>